<commit_message>
added flyers standard template
</commit_message>
<xml_diff>
--- a/Promotion/Banner.pptx
+++ b/Promotion/Banner.pptx
@@ -130,7 +130,7 @@
   <pc:docChgLst>
     <pc:chgData name="Jonas Klein" userId="ea05bc84257bba26" providerId="LiveId" clId="{34A38C99-8232-2442-BE6C-7951EEAE2D9A}"/>
     <pc:docChg chg="undo custSel addSld modSld">
-      <pc:chgData name="Jonas Klein" userId="ea05bc84257bba26" providerId="LiveId" clId="{34A38C99-8232-2442-BE6C-7951EEAE2D9A}" dt="2024-02-05T23:04:01.379" v="541" actId="2085"/>
+      <pc:chgData name="Jonas Klein" userId="ea05bc84257bba26" providerId="LiveId" clId="{34A38C99-8232-2442-BE6C-7951EEAE2D9A}" dt="2024-02-06T00:11:50.077" v="543" actId="732"/>
       <pc:docMkLst>
         <pc:docMk/>
       </pc:docMkLst>
@@ -397,7 +397,7 @@
         </pc:cxnChg>
       </pc:sldChg>
       <pc:sldChg chg="delSp modSp add mod">
-        <pc:chgData name="Jonas Klein" userId="ea05bc84257bba26" providerId="LiveId" clId="{34A38C99-8232-2442-BE6C-7951EEAE2D9A}" dt="2024-02-05T23:02:58.714" v="530" actId="14100"/>
+        <pc:chgData name="Jonas Klein" userId="ea05bc84257bba26" providerId="LiveId" clId="{34A38C99-8232-2442-BE6C-7951EEAE2D9A}" dt="2024-02-06T00:11:50.077" v="543" actId="732"/>
         <pc:sldMkLst>
           <pc:docMk/>
           <pc:sldMk cId="579764426" sldId="258"/>
@@ -426,6 +426,14 @@
             <ac:spMk id="34" creationId="{44991924-9FAB-1A6C-1BD7-B43DC30200BE}"/>
           </ac:spMkLst>
         </pc:spChg>
+        <pc:picChg chg="mod modCrop">
+          <ac:chgData name="Jonas Klein" userId="ea05bc84257bba26" providerId="LiveId" clId="{34A38C99-8232-2442-BE6C-7951EEAE2D9A}" dt="2024-02-06T00:11:50.077" v="543" actId="732"/>
+          <ac:picMkLst>
+            <pc:docMk/>
+            <pc:sldMk cId="579764426" sldId="258"/>
+            <ac:picMk id="20" creationId="{59623E44-7B03-469C-3CB0-65E00C1DD26D}"/>
+          </ac:picMkLst>
+        </pc:picChg>
         <pc:picChg chg="mod">
           <ac:chgData name="Jonas Klein" userId="ea05bc84257bba26" providerId="LiveId" clId="{34A38C99-8232-2442-BE6C-7951EEAE2D9A}" dt="2024-02-05T23:01:07.327" v="522" actId="170"/>
           <ac:picMkLst>
@@ -562,7 +570,7 @@
           <a:p>
             <a:fld id="{53680054-B55F-244C-AA66-3BFB6966FDF0}" type="datetimeFigureOut">
               <a:rPr lang="en-NL" smtClean="0"/>
-              <a:t>05/02/2024</a:t>
+              <a:t>06/02/2024</a:t>
             </a:fld>
             <a:endParaRPr lang="en-NL"/>
           </a:p>
@@ -1279,7 +1287,7 @@
           <a:p>
             <a:fld id="{E81A115C-116B-1141-B417-8A36DE5D7C24}" type="datetimeFigureOut">
               <a:rPr lang="en-NL" smtClean="0"/>
-              <a:t>05/02/2024</a:t>
+              <a:t>06/02/2024</a:t>
             </a:fld>
             <a:endParaRPr lang="en-NL"/>
           </a:p>
@@ -1479,7 +1487,7 @@
           <a:p>
             <a:fld id="{E81A115C-116B-1141-B417-8A36DE5D7C24}" type="datetimeFigureOut">
               <a:rPr lang="en-NL" smtClean="0"/>
-              <a:t>05/02/2024</a:t>
+              <a:t>06/02/2024</a:t>
             </a:fld>
             <a:endParaRPr lang="en-NL"/>
           </a:p>
@@ -1689,7 +1697,7 @@
           <a:p>
             <a:fld id="{E81A115C-116B-1141-B417-8A36DE5D7C24}" type="datetimeFigureOut">
               <a:rPr lang="en-NL" smtClean="0"/>
-              <a:t>05/02/2024</a:t>
+              <a:t>06/02/2024</a:t>
             </a:fld>
             <a:endParaRPr lang="en-NL"/>
           </a:p>
@@ -1889,7 +1897,7 @@
           <a:p>
             <a:fld id="{E81A115C-116B-1141-B417-8A36DE5D7C24}" type="datetimeFigureOut">
               <a:rPr lang="en-NL" smtClean="0"/>
-              <a:t>05/02/2024</a:t>
+              <a:t>06/02/2024</a:t>
             </a:fld>
             <a:endParaRPr lang="en-NL"/>
           </a:p>
@@ -2165,7 +2173,7 @@
           <a:p>
             <a:fld id="{E81A115C-116B-1141-B417-8A36DE5D7C24}" type="datetimeFigureOut">
               <a:rPr lang="en-NL" smtClean="0"/>
-              <a:t>05/02/2024</a:t>
+              <a:t>06/02/2024</a:t>
             </a:fld>
             <a:endParaRPr lang="en-NL"/>
           </a:p>
@@ -2433,7 +2441,7 @@
           <a:p>
             <a:fld id="{E81A115C-116B-1141-B417-8A36DE5D7C24}" type="datetimeFigureOut">
               <a:rPr lang="en-NL" smtClean="0"/>
-              <a:t>05/02/2024</a:t>
+              <a:t>06/02/2024</a:t>
             </a:fld>
             <a:endParaRPr lang="en-NL"/>
           </a:p>
@@ -2848,7 +2856,7 @@
           <a:p>
             <a:fld id="{E81A115C-116B-1141-B417-8A36DE5D7C24}" type="datetimeFigureOut">
               <a:rPr lang="en-NL" smtClean="0"/>
-              <a:t>05/02/2024</a:t>
+              <a:t>06/02/2024</a:t>
             </a:fld>
             <a:endParaRPr lang="en-NL"/>
           </a:p>
@@ -2990,7 +2998,7 @@
           <a:p>
             <a:fld id="{E81A115C-116B-1141-B417-8A36DE5D7C24}" type="datetimeFigureOut">
               <a:rPr lang="en-NL" smtClean="0"/>
-              <a:t>05/02/2024</a:t>
+              <a:t>06/02/2024</a:t>
             </a:fld>
             <a:endParaRPr lang="en-NL"/>
           </a:p>
@@ -3103,7 +3111,7 @@
           <a:p>
             <a:fld id="{E81A115C-116B-1141-B417-8A36DE5D7C24}" type="datetimeFigureOut">
               <a:rPr lang="en-NL" smtClean="0"/>
-              <a:t>05/02/2024</a:t>
+              <a:t>06/02/2024</a:t>
             </a:fld>
             <a:endParaRPr lang="en-NL"/>
           </a:p>
@@ -3416,7 +3424,7 @@
           <a:p>
             <a:fld id="{E81A115C-116B-1141-B417-8A36DE5D7C24}" type="datetimeFigureOut">
               <a:rPr lang="en-NL" smtClean="0"/>
-              <a:t>05/02/2024</a:t>
+              <a:t>06/02/2024</a:t>
             </a:fld>
             <a:endParaRPr lang="en-NL"/>
           </a:p>
@@ -3705,7 +3713,7 @@
           <a:p>
             <a:fld id="{E81A115C-116B-1141-B417-8A36DE5D7C24}" type="datetimeFigureOut">
               <a:rPr lang="en-NL" smtClean="0"/>
-              <a:t>05/02/2024</a:t>
+              <a:t>06/02/2024</a:t>
             </a:fld>
             <a:endParaRPr lang="en-NL"/>
           </a:p>
@@ -3948,7 +3956,7 @@
           <a:p>
             <a:fld id="{E81A115C-116B-1141-B417-8A36DE5D7C24}" type="datetimeFigureOut">
               <a:rPr lang="en-NL" smtClean="0"/>
-              <a:t>05/02/2024</a:t>
+              <a:t>06/02/2024</a:t>
             </a:fld>
             <a:endParaRPr lang="en-NL"/>
           </a:p>
@@ -5131,7 +5139,7 @@
         <p:spPr>
           <a:xfrm>
             <a:off x="8202440" y="2329040"/>
-            <a:ext cx="3527600" cy="2286000"/>
+            <a:ext cx="3527599" cy="2286000"/>
           </a:xfrm>
           <a:prstGeom prst="rect">
             <a:avLst/>

</xml_diff>

<commit_message>
updated banner and flyer
</commit_message>
<xml_diff>
--- a/Promotion/Banner.pptx
+++ b/Promotion/Banner.pptx
@@ -120,7 +120,7 @@
 <file path=ppt/revisionInfo.xml><?xml version="1.0" encoding="utf-8"?>
 <p1510:revInfo xmlns:a="http://schemas.openxmlformats.org/drawingml/2006/main" xmlns:r="http://schemas.openxmlformats.org/officeDocument/2006/relationships" xmlns:p1510="http://schemas.microsoft.com/office/powerpoint/2015/10/main">
   <p1510:revLst>
-    <p1510:client id="{34A38C99-8232-2442-BE6C-7951EEAE2D9A}" v="90" dt="2024-02-05T23:03:52.266"/>
+    <p1510:client id="{34A38C99-8232-2442-BE6C-7951EEAE2D9A}" v="91" dt="2024-02-07T13:30:26.612"/>
   </p1510:revLst>
 </p1510:revInfo>
 </file>
@@ -130,7 +130,7 @@
   <pc:docChgLst>
     <pc:chgData name="Jonas Klein" userId="ea05bc84257bba26" providerId="LiveId" clId="{34A38C99-8232-2442-BE6C-7951EEAE2D9A}"/>
     <pc:docChg chg="undo custSel addSld modSld">
-      <pc:chgData name="Jonas Klein" userId="ea05bc84257bba26" providerId="LiveId" clId="{34A38C99-8232-2442-BE6C-7951EEAE2D9A}" dt="2024-02-06T00:11:50.077" v="543" actId="732"/>
+      <pc:chgData name="Jonas Klein" userId="ea05bc84257bba26" providerId="LiveId" clId="{34A38C99-8232-2442-BE6C-7951EEAE2D9A}" dt="2024-02-07T13:30:53.424" v="549" actId="1076"/>
       <pc:docMkLst>
         <pc:docMk/>
       </pc:docMkLst>
@@ -396,8 +396,8 @@
           </ac:cxnSpMkLst>
         </pc:cxnChg>
       </pc:sldChg>
-      <pc:sldChg chg="delSp modSp add mod">
-        <pc:chgData name="Jonas Klein" userId="ea05bc84257bba26" providerId="LiveId" clId="{34A38C99-8232-2442-BE6C-7951EEAE2D9A}" dt="2024-02-06T00:11:50.077" v="543" actId="732"/>
+      <pc:sldChg chg="addSp delSp modSp add mod">
+        <pc:chgData name="Jonas Klein" userId="ea05bc84257bba26" providerId="LiveId" clId="{34A38C99-8232-2442-BE6C-7951EEAE2D9A}" dt="2024-02-07T13:30:53.424" v="549" actId="1076"/>
         <pc:sldMkLst>
           <pc:docMk/>
           <pc:sldMk cId="579764426" sldId="258"/>
@@ -426,6 +426,30 @@
             <ac:spMk id="34" creationId="{44991924-9FAB-1A6C-1BD7-B43DC30200BE}"/>
           </ac:spMkLst>
         </pc:spChg>
+        <pc:picChg chg="mod">
+          <ac:chgData name="Jonas Klein" userId="ea05bc84257bba26" providerId="LiveId" clId="{34A38C99-8232-2442-BE6C-7951EEAE2D9A}" dt="2024-02-07T13:30:48.456" v="548" actId="1076"/>
+          <ac:picMkLst>
+            <pc:docMk/>
+            <pc:sldMk cId="579764426" sldId="258"/>
+            <ac:picMk id="2" creationId="{AF2CA782-5557-2B50-CA28-64DB156A59BE}"/>
+          </ac:picMkLst>
+        </pc:picChg>
+        <pc:picChg chg="add mod">
+          <ac:chgData name="Jonas Klein" userId="ea05bc84257bba26" providerId="LiveId" clId="{34A38C99-8232-2442-BE6C-7951EEAE2D9A}" dt="2024-02-07T13:30:45.221" v="547" actId="1076"/>
+          <ac:picMkLst>
+            <pc:docMk/>
+            <pc:sldMk cId="579764426" sldId="258"/>
+            <ac:picMk id="7" creationId="{03226BCB-9C45-4A58-E197-4B6FDD842E5D}"/>
+          </ac:picMkLst>
+        </pc:picChg>
+        <pc:picChg chg="add mod">
+          <ac:chgData name="Jonas Klein" userId="ea05bc84257bba26" providerId="LiveId" clId="{34A38C99-8232-2442-BE6C-7951EEAE2D9A}" dt="2024-02-07T13:30:53.424" v="549" actId="1076"/>
+          <ac:picMkLst>
+            <pc:docMk/>
+            <pc:sldMk cId="579764426" sldId="258"/>
+            <ac:picMk id="8" creationId="{82767E73-F96A-EC53-4F1A-6FF126B3C86B}"/>
+          </ac:picMkLst>
+        </pc:picChg>
         <pc:picChg chg="mod modCrop">
           <ac:chgData name="Jonas Klein" userId="ea05bc84257bba26" providerId="LiveId" clId="{34A38C99-8232-2442-BE6C-7951EEAE2D9A}" dt="2024-02-06T00:11:50.077" v="543" actId="732"/>
           <ac:picMkLst>
@@ -570,7 +594,7 @@
           <a:p>
             <a:fld id="{53680054-B55F-244C-AA66-3BFB6966FDF0}" type="datetimeFigureOut">
               <a:rPr lang="en-NL" smtClean="0"/>
-              <a:t>06/02/2024</a:t>
+              <a:t>07/02/2024</a:t>
             </a:fld>
             <a:endParaRPr lang="en-NL"/>
           </a:p>
@@ -1287,7 +1311,7 @@
           <a:p>
             <a:fld id="{E81A115C-116B-1141-B417-8A36DE5D7C24}" type="datetimeFigureOut">
               <a:rPr lang="en-NL" smtClean="0"/>
-              <a:t>06/02/2024</a:t>
+              <a:t>07/02/2024</a:t>
             </a:fld>
             <a:endParaRPr lang="en-NL"/>
           </a:p>
@@ -1487,7 +1511,7 @@
           <a:p>
             <a:fld id="{E81A115C-116B-1141-B417-8A36DE5D7C24}" type="datetimeFigureOut">
               <a:rPr lang="en-NL" smtClean="0"/>
-              <a:t>06/02/2024</a:t>
+              <a:t>07/02/2024</a:t>
             </a:fld>
             <a:endParaRPr lang="en-NL"/>
           </a:p>
@@ -1697,7 +1721,7 @@
           <a:p>
             <a:fld id="{E81A115C-116B-1141-B417-8A36DE5D7C24}" type="datetimeFigureOut">
               <a:rPr lang="en-NL" smtClean="0"/>
-              <a:t>06/02/2024</a:t>
+              <a:t>07/02/2024</a:t>
             </a:fld>
             <a:endParaRPr lang="en-NL"/>
           </a:p>
@@ -1897,7 +1921,7 @@
           <a:p>
             <a:fld id="{E81A115C-116B-1141-B417-8A36DE5D7C24}" type="datetimeFigureOut">
               <a:rPr lang="en-NL" smtClean="0"/>
-              <a:t>06/02/2024</a:t>
+              <a:t>07/02/2024</a:t>
             </a:fld>
             <a:endParaRPr lang="en-NL"/>
           </a:p>
@@ -2173,7 +2197,7 @@
           <a:p>
             <a:fld id="{E81A115C-116B-1141-B417-8A36DE5D7C24}" type="datetimeFigureOut">
               <a:rPr lang="en-NL" smtClean="0"/>
-              <a:t>06/02/2024</a:t>
+              <a:t>07/02/2024</a:t>
             </a:fld>
             <a:endParaRPr lang="en-NL"/>
           </a:p>
@@ -2441,7 +2465,7 @@
           <a:p>
             <a:fld id="{E81A115C-116B-1141-B417-8A36DE5D7C24}" type="datetimeFigureOut">
               <a:rPr lang="en-NL" smtClean="0"/>
-              <a:t>06/02/2024</a:t>
+              <a:t>07/02/2024</a:t>
             </a:fld>
             <a:endParaRPr lang="en-NL"/>
           </a:p>
@@ -2856,7 +2880,7 @@
           <a:p>
             <a:fld id="{E81A115C-116B-1141-B417-8A36DE5D7C24}" type="datetimeFigureOut">
               <a:rPr lang="en-NL" smtClean="0"/>
-              <a:t>06/02/2024</a:t>
+              <a:t>07/02/2024</a:t>
             </a:fld>
             <a:endParaRPr lang="en-NL"/>
           </a:p>
@@ -2998,7 +3022,7 @@
           <a:p>
             <a:fld id="{E81A115C-116B-1141-B417-8A36DE5D7C24}" type="datetimeFigureOut">
               <a:rPr lang="en-NL" smtClean="0"/>
-              <a:t>06/02/2024</a:t>
+              <a:t>07/02/2024</a:t>
             </a:fld>
             <a:endParaRPr lang="en-NL"/>
           </a:p>
@@ -3111,7 +3135,7 @@
           <a:p>
             <a:fld id="{E81A115C-116B-1141-B417-8A36DE5D7C24}" type="datetimeFigureOut">
               <a:rPr lang="en-NL" smtClean="0"/>
-              <a:t>06/02/2024</a:t>
+              <a:t>07/02/2024</a:t>
             </a:fld>
             <a:endParaRPr lang="en-NL"/>
           </a:p>
@@ -3424,7 +3448,7 @@
           <a:p>
             <a:fld id="{E81A115C-116B-1141-B417-8A36DE5D7C24}" type="datetimeFigureOut">
               <a:rPr lang="en-NL" smtClean="0"/>
-              <a:t>06/02/2024</a:t>
+              <a:t>07/02/2024</a:t>
             </a:fld>
             <a:endParaRPr lang="en-NL"/>
           </a:p>
@@ -3713,7 +3737,7 @@
           <a:p>
             <a:fld id="{E81A115C-116B-1141-B417-8A36DE5D7C24}" type="datetimeFigureOut">
               <a:rPr lang="en-NL" smtClean="0"/>
-              <a:t>06/02/2024</a:t>
+              <a:t>07/02/2024</a:t>
             </a:fld>
             <a:endParaRPr lang="en-NL"/>
           </a:p>
@@ -3956,7 +3980,7 @@
           <a:p>
             <a:fld id="{E81A115C-116B-1141-B417-8A36DE5D7C24}" type="datetimeFigureOut">
               <a:rPr lang="en-NL" smtClean="0"/>
-              <a:t>06/02/2024</a:t>
+              <a:t>07/02/2024</a:t>
             </a:fld>
             <a:endParaRPr lang="en-NL"/>
           </a:p>
@@ -5174,7 +5198,7 @@
         </p:blipFill>
         <p:spPr>
           <a:xfrm>
-            <a:off x="3234725" y="3132173"/>
+            <a:off x="3234726" y="3193809"/>
             <a:ext cx="4737472" cy="1482867"/>
           </a:xfrm>
           <a:prstGeom prst="rect">
@@ -5409,6 +5433,71 @@
           <a:xfrm>
             <a:off x="7773244" y="2875572"/>
             <a:ext cx="1354881" cy="1845648"/>
+          </a:xfrm>
+          <a:prstGeom prst="rect">
+            <a:avLst/>
+          </a:prstGeom>
+        </p:spPr>
+      </p:pic>
+      <p:pic>
+        <p:nvPicPr>
+          <p:cNvPr id="7" name="Picture 6" descr="A qr code on a white background&#10;&#10;Description automatically generated">
+            <a:extLst>
+              <a:ext uri="{FF2B5EF4-FFF2-40B4-BE49-F238E27FC236}">
+                <a16:creationId xmlns:a16="http://schemas.microsoft.com/office/drawing/2014/main" id="{03226BCB-9C45-4A58-E197-4B6FDD842E5D}"/>
+              </a:ext>
+            </a:extLst>
+          </p:cNvPr>
+          <p:cNvPicPr>
+            <a:picLocks noChangeAspect="1"/>
+          </p:cNvPicPr>
+          <p:nvPr/>
+        </p:nvPicPr>
+        <p:blipFill rotWithShape="1">
+          <a:blip r:embed="rId8">
+            <a:extLst>
+              <a:ext uri="{28A0092B-C50C-407E-A947-70E740481C1C}">
+                <a14:useLocalDpi xmlns:a14="http://schemas.microsoft.com/office/drawing/2010/main" val="0"/>
+              </a:ext>
+            </a:extLst>
+          </a:blip>
+          <a:srcRect b="23348"/>
+          <a:stretch/>
+        </p:blipFill>
+        <p:spPr>
+          <a:xfrm>
+            <a:off x="6273522" y="2245710"/>
+            <a:ext cx="1268091" cy="1259724"/>
+          </a:xfrm>
+          <a:prstGeom prst="rect">
+            <a:avLst/>
+          </a:prstGeom>
+        </p:spPr>
+      </p:pic>
+      <p:pic>
+        <p:nvPicPr>
+          <p:cNvPr id="8" name="Picture 7" descr="A qr code on a white background&#10;&#10;Description automatically generated">
+            <a:extLst>
+              <a:ext uri="{FF2B5EF4-FFF2-40B4-BE49-F238E27FC236}">
+                <a16:creationId xmlns:a16="http://schemas.microsoft.com/office/drawing/2014/main" id="{82767E73-F96A-EC53-4F1A-6FF126B3C86B}"/>
+              </a:ext>
+            </a:extLst>
+          </p:cNvPr>
+          <p:cNvPicPr>
+            <a:picLocks noChangeAspect="1"/>
+          </p:cNvPicPr>
+          <p:nvPr/>
+        </p:nvPicPr>
+        <p:blipFill>
+          <a:blip r:embed="rId9"/>
+          <a:stretch>
+            <a:fillRect/>
+          </a:stretch>
+        </p:blipFill>
+        <p:spPr>
+          <a:xfrm>
+            <a:off x="6424090" y="2381566"/>
+            <a:ext cx="988000" cy="988000"/>
           </a:xfrm>
           <a:prstGeom prst="rect">
             <a:avLst/>

</xml_diff>